<commit_message>
add SS files, update other stuff
</commit_message>
<xml_diff>
--- a/Modeling Recruitment in Stock Synthesis.pptx
+++ b/Modeling Recruitment in Stock Synthesis.pptx
@@ -7814,7 +7814,7 @@
         <p:spPr/>
         <p:txBody>
           <a:bodyPr>
-            <a:normAutofit fontScale="92500" lnSpcReduction="20000"/>
+            <a:normAutofit fontScale="85000" lnSpcReduction="20000"/>
           </a:bodyPr>
           <a:lstStyle/>
           <a:p>
@@ -7948,6 +7948,33 @@
               <a:rPr lang="en-US" dirty="0" smtClean="0"/>
               <a:t>A few ideas for the future</a:t>
             </a:r>
+          </a:p>
+          <a:p>
+            <a:r>
+              <a:rPr lang="en-US" dirty="0" smtClean="0"/>
+              <a:t>Some files </a:t>
+            </a:r>
+            <a:r>
+              <a:rPr lang="en-US" dirty="0"/>
+              <a:t>on </a:t>
+            </a:r>
+            <a:r>
+              <a:rPr lang="en-US" dirty="0" smtClean="0"/>
+              <a:t>GitHub </a:t>
+            </a:r>
+            <a:r>
+              <a:rPr lang="en-US" dirty="0" smtClean="0">
+                <a:hlinkClick r:id="rId2"/>
+              </a:rPr>
+              <a:t>https</a:t>
+            </a:r>
+            <a:r>
+              <a:rPr lang="en-US" dirty="0">
+                <a:hlinkClick r:id="rId2"/>
+              </a:rPr>
+              <a:t>://github.com/taylori/SSrecruitment</a:t>
+            </a:r>
+            <a:endParaRPr lang="en-US" dirty="0" smtClean="0"/>
           </a:p>
           <a:p>
             <a:pPr lvl="1"/>

</xml_diff>

<commit_message>
update talk, remove extra file
</commit_message>
<xml_diff>
--- a/Modeling Recruitment in Stock Synthesis.pptx
+++ b/Modeling Recruitment in Stock Synthesis.pptx
@@ -12325,9 +12325,31 @@
         <p:spPr/>
         <p:txBody>
           <a:bodyPr>
-            <a:normAutofit fontScale="92500"/>
+            <a:normAutofit fontScale="92500" lnSpcReduction="20000"/>
           </a:bodyPr>
           <a:lstStyle/>
+          <a:p>
+            <a:r>
+              <a:rPr lang="en-US" dirty="0"/>
+              <a:t>Johnson, K.F., </a:t>
+            </a:r>
+            <a:r>
+              <a:rPr lang="en-US" dirty="0" err="1"/>
+              <a:t>Councill</a:t>
+            </a:r>
+            <a:r>
+              <a:rPr lang="en-US" dirty="0"/>
+              <a:t>, E., Thorson, J.T., Brooks, E., </a:t>
+            </a:r>
+            <a:r>
+              <a:rPr lang="en-US" dirty="0" err="1"/>
+              <a:t>Methot</a:t>
+            </a:r>
+            <a:r>
+              <a:rPr lang="en-US" dirty="0"/>
+              <a:t>, R.D., Punt, A.E., 2016. Can autocorrelated recruitment be estimated using integrated assessment models and how does it affect population forecasts? Fish. Res. 183, 222–232.</a:t>
+            </a:r>
+          </a:p>
           <a:p>
             <a:r>
               <a:rPr lang="en-US" dirty="0" err="1" smtClean="0"/>

</xml_diff>